<commit_message>
Scaled dot product attention
</commit_message>
<xml_diff>
--- a/Presentation/ppt8 Transformer.pptx
+++ b/Presentation/ppt8 Transformer.pptx
@@ -5,10 +5,10 @@
     <p:sldMasterId id="2147483660" r:id="rId4"/>
   </p:sldMasterIdLst>
   <p:notesMasterIdLst>
-    <p:notesMasterId r:id="rId10"/>
+    <p:notesMasterId r:id="rId13"/>
   </p:notesMasterIdLst>
   <p:handoutMasterIdLst>
-    <p:handoutMasterId r:id="rId11"/>
+    <p:handoutMasterId r:id="rId14"/>
   </p:handoutMasterIdLst>
   <p:sldIdLst>
     <p:sldId id="298" r:id="rId5"/>
@@ -16,6 +16,9 @@
     <p:sldId id="301" r:id="rId7"/>
     <p:sldId id="303" r:id="rId8"/>
     <p:sldId id="304" r:id="rId9"/>
+    <p:sldId id="305" r:id="rId10"/>
+    <p:sldId id="306" r:id="rId11"/>
+    <p:sldId id="307" r:id="rId12"/>
   </p:sldIdLst>
   <p:sldSz cx="12192000" cy="6858000"/>
   <p:notesSz cx="6858000" cy="9144000"/>
@@ -213,7 +216,7 @@
                 <a:latin typeface="Meiryo UI" panose="020B0604030504040204" pitchFamily="50" charset="-128"/>
                 <a:ea typeface="Meiryo UI" panose="020B0604030504040204" pitchFamily="50" charset="-128"/>
               </a:rPr>
-              <a:t>2023/4/26</a:t>
+              <a:t>2023/4/27</a:t>
             </a:fld>
             <a:endParaRPr kumimoji="1" lang="ja-JP" altLang="en-US" dirty="0">
               <a:latin typeface="Meiryo UI" panose="020B0604030504040204" pitchFamily="50" charset="-128"/>
@@ -397,7 +400,7 @@
             <a:fld id="{D5D0D523-8CFC-4A67-BC17-72B1EE12365D}" type="datetime1">
               <a:rPr kumimoji="1" lang="ja-JP" altLang="en-US" smtClean="0"/>
               <a:pPr/>
-              <a:t>2023/4/26</a:t>
+              <a:t>2023/4/27</a:t>
             </a:fld>
             <a:endParaRPr kumimoji="1" lang="ja-JP" altLang="en-US" dirty="0"/>
           </a:p>
@@ -5091,7 +5094,15 @@
           <a:p>
             <a:r>
               <a:rPr kumimoji="1" lang="ja-JP" altLang="en-US" sz="2800" dirty="0"/>
-              <a:t>→必然的に情報の損失が行われる。</a:t>
+              <a:t>→</a:t>
+            </a:r>
+            <a:r>
+              <a:rPr kumimoji="1" lang="ja-JP" altLang="en-US" sz="2800" b="1" dirty="0"/>
+              <a:t>必然的に情報の損失</a:t>
+            </a:r>
+            <a:r>
+              <a:rPr kumimoji="1" lang="ja-JP" altLang="en-US" sz="2800" dirty="0"/>
+              <a:t>が行われる。</a:t>
             </a:r>
             <a:endParaRPr kumimoji="1" lang="en-US" altLang="ja-JP" sz="2800" dirty="0"/>
           </a:p>
@@ -5128,28 +5139,32 @@
               <a:t>のサポートとして使うだけではなく、</a:t>
             </a:r>
             <a:r>
-              <a:rPr kumimoji="1" lang="en-US" altLang="ja-JP" sz="2800" dirty="0"/>
+              <a:rPr kumimoji="1" lang="en-US" altLang="ja-JP" sz="2800" b="1" dirty="0"/>
               <a:t>Attention</a:t>
             </a:r>
             <a:r>
+              <a:rPr lang="ja-JP" altLang="en-US" sz="2800" b="1" dirty="0"/>
+              <a:t>だけで</a:t>
+            </a:r>
+            <a:r>
+              <a:rPr kumimoji="1" lang="en-US" altLang="ja-JP" sz="2800" b="1" dirty="0"/>
+              <a:t>Encoder</a:t>
+            </a:r>
+            <a:r>
+              <a:rPr lang="ja-JP" altLang="en-US" sz="2800" b="1" dirty="0"/>
+              <a:t>と</a:t>
+            </a:r>
+            <a:r>
+              <a:rPr lang="en-US" altLang="ja-JP" sz="2800" b="1" dirty="0"/>
+              <a:t>Decoder</a:t>
+            </a:r>
+            <a:r>
+              <a:rPr lang="ja-JP" altLang="en-US" sz="2800" b="1" dirty="0"/>
+              <a:t>を具現</a:t>
+            </a:r>
+            <a:r>
               <a:rPr lang="ja-JP" altLang="en-US" sz="2800" dirty="0"/>
-              <a:t>だけで</a:t>
-            </a:r>
-            <a:r>
-              <a:rPr kumimoji="1" lang="en-US" altLang="ja-JP" sz="2800" dirty="0"/>
-              <a:t>Encoder</a:t>
-            </a:r>
-            <a:r>
-              <a:rPr lang="ja-JP" altLang="en-US" sz="2800" dirty="0"/>
-              <a:t>と</a:t>
-            </a:r>
-            <a:r>
-              <a:rPr lang="en-US" altLang="ja-JP" sz="2800" dirty="0"/>
-              <a:t>Decoder</a:t>
-            </a:r>
-            <a:r>
-              <a:rPr lang="ja-JP" altLang="en-US" sz="2800" dirty="0"/>
-              <a:t>を具現させたもの。</a:t>
+              <a:t>させたもの。</a:t>
             </a:r>
             <a:endParaRPr kumimoji="1" lang="ja-JP" altLang="en-US" sz="2800" dirty="0"/>
           </a:p>
@@ -5278,7 +5293,7 @@
         </p:nvSpPr>
         <p:spPr>
           <a:xfrm>
-            <a:off x="8026400" y="2463800"/>
+            <a:off x="8026400" y="2616200"/>
             <a:ext cx="965200" cy="381000"/>
           </a:xfrm>
           <a:prstGeom prst="roundRect">
@@ -5327,7 +5342,7 @@
         </p:nvSpPr>
         <p:spPr>
           <a:xfrm>
-            <a:off x="8026400" y="3009900"/>
+            <a:off x="8026400" y="3162300"/>
             <a:ext cx="965200" cy="381000"/>
           </a:xfrm>
           <a:prstGeom prst="roundRect">
@@ -5376,7 +5391,7 @@
         </p:nvSpPr>
         <p:spPr>
           <a:xfrm>
-            <a:off x="8026400" y="3556000"/>
+            <a:off x="8026400" y="3708400"/>
             <a:ext cx="965200" cy="381000"/>
           </a:xfrm>
           <a:prstGeom prst="roundRect">
@@ -5425,7 +5440,7 @@
         </p:nvSpPr>
         <p:spPr>
           <a:xfrm>
-            <a:off x="8026400" y="4102100"/>
+            <a:off x="8026400" y="4254500"/>
             <a:ext cx="965200" cy="381000"/>
           </a:xfrm>
           <a:prstGeom prst="roundRect">
@@ -5474,7 +5489,7 @@
         </p:nvSpPr>
         <p:spPr>
           <a:xfrm>
-            <a:off x="8026400" y="4648200"/>
+            <a:off x="8026400" y="4800600"/>
             <a:ext cx="965200" cy="381000"/>
           </a:xfrm>
           <a:prstGeom prst="roundRect">
@@ -5523,7 +5538,7 @@
         </p:nvSpPr>
         <p:spPr>
           <a:xfrm>
-            <a:off x="8026400" y="5194300"/>
+            <a:off x="8026400" y="5346700"/>
             <a:ext cx="965200" cy="381000"/>
           </a:xfrm>
           <a:prstGeom prst="roundRect">
@@ -5572,7 +5587,7 @@
         </p:nvSpPr>
         <p:spPr>
           <a:xfrm>
-            <a:off x="9550400" y="2463800"/>
+            <a:off x="9550400" y="2616200"/>
             <a:ext cx="965200" cy="381000"/>
           </a:xfrm>
           <a:prstGeom prst="roundRect">
@@ -5624,7 +5639,7 @@
         </p:nvSpPr>
         <p:spPr>
           <a:xfrm>
-            <a:off x="9550400" y="3009900"/>
+            <a:off x="9550400" y="3162300"/>
             <a:ext cx="965200" cy="381000"/>
           </a:xfrm>
           <a:prstGeom prst="roundRect">
@@ -5676,7 +5691,7 @@
         </p:nvSpPr>
         <p:spPr>
           <a:xfrm>
-            <a:off x="9550400" y="3556000"/>
+            <a:off x="9550400" y="3708400"/>
             <a:ext cx="965200" cy="381000"/>
           </a:xfrm>
           <a:prstGeom prst="roundRect">
@@ -5728,7 +5743,7 @@
         </p:nvSpPr>
         <p:spPr>
           <a:xfrm>
-            <a:off x="9550400" y="4102100"/>
+            <a:off x="9550400" y="4254500"/>
             <a:ext cx="965200" cy="381000"/>
           </a:xfrm>
           <a:prstGeom prst="roundRect">
@@ -5780,7 +5795,7 @@
         </p:nvSpPr>
         <p:spPr>
           <a:xfrm>
-            <a:off x="9550400" y="4648200"/>
+            <a:off x="9550400" y="4800600"/>
             <a:ext cx="965200" cy="381000"/>
           </a:xfrm>
           <a:prstGeom prst="roundRect">
@@ -5832,7 +5847,7 @@
         </p:nvSpPr>
         <p:spPr>
           <a:xfrm>
-            <a:off x="9550400" y="5194300"/>
+            <a:off x="9550400" y="5346700"/>
             <a:ext cx="965200" cy="381000"/>
           </a:xfrm>
           <a:prstGeom prst="roundRect">
@@ -5887,7 +5902,7 @@
         </p:nvCxnSpPr>
         <p:spPr>
           <a:xfrm>
-            <a:off x="8991600" y="2654300"/>
+            <a:off x="8991600" y="2806700"/>
             <a:ext cx="558800" cy="0"/>
           </a:xfrm>
           <a:prstGeom prst="straightConnector1">
@@ -5932,7 +5947,7 @@
         </p:nvCxnSpPr>
         <p:spPr>
           <a:xfrm>
-            <a:off x="8991600" y="2654300"/>
+            <a:off x="8991600" y="2806700"/>
             <a:ext cx="558800" cy="546100"/>
           </a:xfrm>
           <a:prstGeom prst="straightConnector1">
@@ -5977,7 +5992,7 @@
         </p:nvCxnSpPr>
         <p:spPr>
           <a:xfrm>
-            <a:off x="8991600" y="2654300"/>
+            <a:off x="8991600" y="2806700"/>
             <a:ext cx="558800" cy="1092200"/>
           </a:xfrm>
           <a:prstGeom prst="straightConnector1">
@@ -6022,7 +6037,7 @@
         </p:nvCxnSpPr>
         <p:spPr>
           <a:xfrm>
-            <a:off x="8991600" y="2654300"/>
+            <a:off x="8991600" y="2806700"/>
             <a:ext cx="558800" cy="1638300"/>
           </a:xfrm>
           <a:prstGeom prst="straightConnector1">
@@ -6067,7 +6082,7 @@
         </p:nvCxnSpPr>
         <p:spPr>
           <a:xfrm>
-            <a:off x="8991600" y="2654300"/>
+            <a:off x="8991600" y="2806700"/>
             <a:ext cx="558800" cy="2184400"/>
           </a:xfrm>
           <a:prstGeom prst="straightConnector1">
@@ -6112,7 +6127,7 @@
         </p:nvCxnSpPr>
         <p:spPr>
           <a:xfrm>
-            <a:off x="8991600" y="2654300"/>
+            <a:off x="8991600" y="2806700"/>
             <a:ext cx="558800" cy="2730500"/>
           </a:xfrm>
           <a:prstGeom prst="straightConnector1">
@@ -6140,6 +6155,295 @@
           </a:fontRef>
         </p:style>
       </p:cxnSp>
+      <p:sp>
+        <p:nvSpPr>
+          <p:cNvPr id="3" name="矢印: 上 2">
+            <a:extLst>
+              <a:ext uri="{FF2B5EF4-FFF2-40B4-BE49-F238E27FC236}">
+                <a16:creationId xmlns:a16="http://schemas.microsoft.com/office/drawing/2014/main" id="{AD4D9B9E-85B0-FBD7-AB42-DC5BE2D01156}"/>
+              </a:ext>
+            </a:extLst>
+          </p:cNvPr>
+          <p:cNvSpPr/>
+          <p:nvPr/>
+        </p:nvSpPr>
+        <p:spPr>
+          <a:xfrm>
+            <a:off x="8172450" y="5822950"/>
+            <a:ext cx="673100" cy="266700"/>
+          </a:xfrm>
+          <a:prstGeom prst="upArrow">
+            <a:avLst/>
+          </a:prstGeom>
+          <a:solidFill>
+            <a:schemeClr val="tx1"/>
+          </a:solidFill>
+          <a:ln>
+            <a:noFill/>
+          </a:ln>
+        </p:spPr>
+        <p:style>
+          <a:lnRef idx="2">
+            <a:schemeClr val="accent1">
+              <a:shade val="50000"/>
+            </a:schemeClr>
+          </a:lnRef>
+          <a:fillRef idx="1">
+            <a:schemeClr val="accent1"/>
+          </a:fillRef>
+          <a:effectRef idx="0">
+            <a:schemeClr val="accent1"/>
+          </a:effectRef>
+          <a:fontRef idx="minor">
+            <a:schemeClr val="lt1"/>
+          </a:fontRef>
+        </p:style>
+        <p:txBody>
+          <a:bodyPr rtlCol="0" anchor="ctr"/>
+          <a:lstStyle/>
+          <a:p>
+            <a:pPr algn="ctr"/>
+            <a:endParaRPr kumimoji="1" lang="ja-JP" altLang="en-US"/>
+          </a:p>
+        </p:txBody>
+      </p:sp>
+      <p:sp>
+        <p:nvSpPr>
+          <p:cNvPr id="16" name="矢印: 上 15">
+            <a:extLst>
+              <a:ext uri="{FF2B5EF4-FFF2-40B4-BE49-F238E27FC236}">
+                <a16:creationId xmlns:a16="http://schemas.microsoft.com/office/drawing/2014/main" id="{18BFE6DF-C7D2-9E01-55A2-BE7236DBB530}"/>
+              </a:ext>
+            </a:extLst>
+          </p:cNvPr>
+          <p:cNvSpPr/>
+          <p:nvPr/>
+        </p:nvSpPr>
+        <p:spPr>
+          <a:xfrm>
+            <a:off x="9696450" y="2247900"/>
+            <a:ext cx="673100" cy="266700"/>
+          </a:xfrm>
+          <a:prstGeom prst="upArrow">
+            <a:avLst/>
+          </a:prstGeom>
+          <a:solidFill>
+            <a:srgbClr val="0070C0"/>
+          </a:solidFill>
+          <a:ln>
+            <a:noFill/>
+          </a:ln>
+        </p:spPr>
+        <p:style>
+          <a:lnRef idx="2">
+            <a:schemeClr val="accent1">
+              <a:shade val="50000"/>
+            </a:schemeClr>
+          </a:lnRef>
+          <a:fillRef idx="1">
+            <a:schemeClr val="accent1"/>
+          </a:fillRef>
+          <a:effectRef idx="0">
+            <a:schemeClr val="accent1"/>
+          </a:effectRef>
+          <a:fontRef idx="minor">
+            <a:schemeClr val="lt1"/>
+          </a:fontRef>
+        </p:style>
+        <p:txBody>
+          <a:bodyPr rtlCol="0" anchor="ctr"/>
+          <a:lstStyle/>
+          <a:p>
+            <a:pPr algn="ctr"/>
+            <a:endParaRPr kumimoji="1" lang="ja-JP" altLang="en-US"/>
+          </a:p>
+        </p:txBody>
+      </p:sp>
+      <p:sp>
+        <p:nvSpPr>
+          <p:cNvPr id="18" name="テキスト ボックス 17">
+            <a:extLst>
+              <a:ext uri="{FF2B5EF4-FFF2-40B4-BE49-F238E27FC236}">
+                <a16:creationId xmlns:a16="http://schemas.microsoft.com/office/drawing/2014/main" id="{3BED894A-E2B5-6E0E-ED6B-C3122010CFB2}"/>
+              </a:ext>
+            </a:extLst>
+          </p:cNvPr>
+          <p:cNvSpPr txBox="1"/>
+          <p:nvPr/>
+        </p:nvSpPr>
+        <p:spPr>
+          <a:xfrm>
+            <a:off x="1264602" y="4891782"/>
+            <a:ext cx="5629275" cy="1077218"/>
+          </a:xfrm>
+          <a:prstGeom prst="rect">
+            <a:avLst/>
+          </a:prstGeom>
+          <a:noFill/>
+        </p:spPr>
+        <p:txBody>
+          <a:bodyPr wrap="square" rtlCol="0">
+            <a:spAutoFit/>
+          </a:bodyPr>
+          <a:lstStyle/>
+          <a:p>
+            <a:r>
+              <a:rPr kumimoji="1" lang="en-US" altLang="ja-JP" sz="3200" dirty="0">
+                <a:solidFill>
+                  <a:schemeClr val="tx1">
+                    <a:lumMod val="75000"/>
+                    <a:lumOff val="25000"/>
+                  </a:schemeClr>
+                </a:solidFill>
+                <a:latin typeface="Meiryo UI" panose="020B0604030504040204" pitchFamily="50" charset="-128"/>
+                <a:ea typeface="Meiryo UI" panose="020B0604030504040204" pitchFamily="50" charset="-128"/>
+              </a:rPr>
+              <a:t>RNN</a:t>
+            </a:r>
+            <a:r>
+              <a:rPr kumimoji="1" lang="ja-JP" altLang="en-US" sz="3200" dirty="0">
+                <a:solidFill>
+                  <a:schemeClr val="tx1">
+                    <a:lumMod val="75000"/>
+                    <a:lumOff val="25000"/>
+                  </a:schemeClr>
+                </a:solidFill>
+                <a:latin typeface="Meiryo UI" panose="020B0604030504040204" pitchFamily="50" charset="-128"/>
+                <a:ea typeface="Meiryo UI" panose="020B0604030504040204" pitchFamily="50" charset="-128"/>
+              </a:rPr>
+              <a:t>の</a:t>
+            </a:r>
+            <a:r>
+              <a:rPr kumimoji="1" lang="en-US" altLang="ja-JP" sz="3200" dirty="0">
+                <a:solidFill>
+                  <a:schemeClr val="tx1">
+                    <a:lumMod val="75000"/>
+                    <a:lumOff val="25000"/>
+                  </a:schemeClr>
+                </a:solidFill>
+                <a:latin typeface="Meiryo UI" panose="020B0604030504040204" pitchFamily="50" charset="-128"/>
+                <a:ea typeface="Meiryo UI" panose="020B0604030504040204" pitchFamily="50" charset="-128"/>
+              </a:rPr>
+              <a:t>time step</a:t>
+            </a:r>
+            <a:r>
+              <a:rPr kumimoji="1" lang="ja-JP" altLang="en-US" sz="3200" dirty="0">
+                <a:solidFill>
+                  <a:schemeClr val="tx1">
+                    <a:lumMod val="75000"/>
+                    <a:lumOff val="25000"/>
+                  </a:schemeClr>
+                </a:solidFill>
+                <a:latin typeface="Meiryo UI" panose="020B0604030504040204" pitchFamily="50" charset="-128"/>
+                <a:ea typeface="Meiryo UI" panose="020B0604030504040204" pitchFamily="50" charset="-128"/>
+              </a:rPr>
+              <a:t>の代わりに</a:t>
+            </a:r>
+            <a:r>
+              <a:rPr kumimoji="1" lang="en-US" altLang="ja-JP" sz="3200" dirty="0">
+                <a:solidFill>
+                  <a:schemeClr val="tx1">
+                    <a:lumMod val="75000"/>
+                    <a:lumOff val="25000"/>
+                  </a:schemeClr>
+                </a:solidFill>
+                <a:latin typeface="Meiryo UI" panose="020B0604030504040204" pitchFamily="50" charset="-128"/>
+                <a:ea typeface="Meiryo UI" panose="020B0604030504040204" pitchFamily="50" charset="-128"/>
+              </a:rPr>
+              <a:t>Encoder </a:t>
+            </a:r>
+            <a:r>
+              <a:rPr kumimoji="1" lang="ja-JP" altLang="en-US" sz="3200" dirty="0">
+                <a:solidFill>
+                  <a:schemeClr val="tx1">
+                    <a:lumMod val="75000"/>
+                    <a:lumOff val="25000"/>
+                  </a:schemeClr>
+                </a:solidFill>
+                <a:latin typeface="Meiryo UI" panose="020B0604030504040204" pitchFamily="50" charset="-128"/>
+                <a:ea typeface="Meiryo UI" panose="020B0604030504040204" pitchFamily="50" charset="-128"/>
+              </a:rPr>
+              <a:t>と</a:t>
+            </a:r>
+            <a:r>
+              <a:rPr kumimoji="1" lang="en-US" altLang="ja-JP" sz="3200" dirty="0">
+                <a:solidFill>
+                  <a:schemeClr val="tx1">
+                    <a:lumMod val="75000"/>
+                    <a:lumOff val="25000"/>
+                  </a:schemeClr>
+                </a:solidFill>
+                <a:latin typeface="Meiryo UI" panose="020B0604030504040204" pitchFamily="50" charset="-128"/>
+                <a:ea typeface="Meiryo UI" panose="020B0604030504040204" pitchFamily="50" charset="-128"/>
+              </a:rPr>
+              <a:t>Decoder</a:t>
+            </a:r>
+            <a:r>
+              <a:rPr kumimoji="1" lang="ja-JP" altLang="en-US" sz="3200" dirty="0">
+                <a:solidFill>
+                  <a:schemeClr val="tx1">
+                    <a:lumMod val="75000"/>
+                    <a:lumOff val="25000"/>
+                  </a:schemeClr>
+                </a:solidFill>
+                <a:latin typeface="Meiryo UI" panose="020B0604030504040204" pitchFamily="50" charset="-128"/>
+                <a:ea typeface="Meiryo UI" panose="020B0604030504040204" pitchFamily="50" charset="-128"/>
+              </a:rPr>
+              <a:t>を積層</a:t>
+            </a:r>
+            <a:endParaRPr kumimoji="1" lang="en-US" altLang="ja-JP" sz="3200" dirty="0">
+              <a:solidFill>
+                <a:schemeClr val="tx1">
+                  <a:lumMod val="75000"/>
+                  <a:lumOff val="25000"/>
+                </a:schemeClr>
+              </a:solidFill>
+              <a:latin typeface="Meiryo UI" panose="020B0604030504040204" pitchFamily="50" charset="-128"/>
+              <a:ea typeface="Meiryo UI" panose="020B0604030504040204" pitchFamily="50" charset="-128"/>
+            </a:endParaRPr>
+          </a:p>
+        </p:txBody>
+      </p:sp>
+      <p:sp>
+        <p:nvSpPr>
+          <p:cNvPr id="20" name="テキスト ボックス 19">
+            <a:extLst>
+              <a:ext uri="{FF2B5EF4-FFF2-40B4-BE49-F238E27FC236}">
+                <a16:creationId xmlns:a16="http://schemas.microsoft.com/office/drawing/2014/main" id="{40723940-597F-C172-94FE-A34AD6D6E186}"/>
+              </a:ext>
+            </a:extLst>
+          </p:cNvPr>
+          <p:cNvSpPr txBox="1"/>
+          <p:nvPr/>
+        </p:nvSpPr>
+        <p:spPr>
+          <a:xfrm>
+            <a:off x="1097280" y="4566165"/>
+            <a:ext cx="5796598" cy="369332"/>
+          </a:xfrm>
+          <a:prstGeom prst="rect">
+            <a:avLst/>
+          </a:prstGeom>
+          <a:noFill/>
+        </p:spPr>
+        <p:txBody>
+          <a:bodyPr wrap="square" rtlCol="0">
+            <a:spAutoFit/>
+          </a:bodyPr>
+          <a:lstStyle/>
+          <a:p>
+            <a:pPr algn="ctr"/>
+            <a:r>
+              <a:rPr kumimoji="1" lang="en-US" altLang="ja-JP" sz="900" dirty="0"/>
+              <a:t>Vaswani, Ashish, et al. "Attention is all you need." Advances in neural information processing systems 30 (2017).</a:t>
+            </a:r>
+          </a:p>
+          <a:p>
+            <a:pPr algn="ctr"/>
+            <a:endParaRPr kumimoji="1" lang="ja-JP" altLang="en-US" sz="900" dirty="0"/>
+          </a:p>
+        </p:txBody>
+      </p:sp>
     </p:spTree>
     <p:extLst>
       <p:ext uri="{BB962C8B-B14F-4D97-AF65-F5344CB8AC3E}">
@@ -6217,17 +6521,1472 @@
         </p:nvSpPr>
         <p:spPr/>
         <p:txBody>
-          <a:bodyPr/>
+          <a:bodyPr>
+            <a:normAutofit/>
+          </a:bodyPr>
           <a:lstStyle/>
           <a:p>
-            <a:endParaRPr kumimoji="1" lang="ja-JP" altLang="en-US"/>
-          </a:p>
-        </p:txBody>
-      </p:sp>
+            <a:r>
+              <a:rPr kumimoji="1" lang="en-US" altLang="ja-JP" sz="2800" dirty="0"/>
+              <a:t>RNN</a:t>
+            </a:r>
+            <a:r>
+              <a:rPr kumimoji="1" lang="ja-JP" altLang="en-US" sz="2800" dirty="0"/>
+              <a:t>の順次性を持つという特徴を使わなくなったため、時系列データである文書を処理するためにはそれぞれの単語の位置を示す必要がある。</a:t>
+            </a:r>
+          </a:p>
+        </p:txBody>
+      </p:sp>
+      <p:pic>
+        <p:nvPicPr>
+          <p:cNvPr id="1026" name="Picture 2">
+            <a:extLst>
+              <a:ext uri="{FF2B5EF4-FFF2-40B4-BE49-F238E27FC236}">
+                <a16:creationId xmlns:a16="http://schemas.microsoft.com/office/drawing/2014/main" id="{01873DF7-7D60-92DB-2149-F7263DD4BF5C}"/>
+              </a:ext>
+            </a:extLst>
+          </p:cNvPr>
+          <p:cNvPicPr>
+            <a:picLocks noChangeAspect="1" noChangeArrowheads="1"/>
+          </p:cNvPicPr>
+          <p:nvPr/>
+        </p:nvPicPr>
+        <p:blipFill>
+          <a:blip r:embed="rId2">
+            <a:extLst>
+              <a:ext uri="{28A0092B-C50C-407E-A947-70E740481C1C}">
+                <a14:useLocalDpi xmlns:a14="http://schemas.microsoft.com/office/drawing/2010/main" val="0"/>
+              </a:ext>
+            </a:extLst>
+          </a:blip>
+          <a:srcRect/>
+          <a:stretch>
+            <a:fillRect/>
+          </a:stretch>
+        </p:blipFill>
+        <p:spPr bwMode="auto">
+          <a:xfrm>
+            <a:off x="861201" y="3873570"/>
+            <a:ext cx="5409918" cy="1098763"/>
+          </a:xfrm>
+          <a:prstGeom prst="rect">
+            <a:avLst/>
+          </a:prstGeom>
+          <a:noFill/>
+          <a:extLst>
+            <a:ext uri="{909E8E84-426E-40DD-AFC4-6F175D3DCCD1}">
+              <a14:hiddenFill xmlns:a14="http://schemas.microsoft.com/office/drawing/2010/main">
+                <a:solidFill>
+                  <a:srgbClr val="FFFFFF"/>
+                </a:solidFill>
+              </a14:hiddenFill>
+            </a:ext>
+          </a:extLst>
+        </p:spPr>
+      </p:pic>
+      <p:sp>
+        <p:nvSpPr>
+          <p:cNvPr id="4" name="テキスト ボックス 3">
+            <a:extLst>
+              <a:ext uri="{FF2B5EF4-FFF2-40B4-BE49-F238E27FC236}">
+                <a16:creationId xmlns:a16="http://schemas.microsoft.com/office/drawing/2014/main" id="{8356D4C3-E54E-FD11-A321-EA48A34577CC}"/>
+              </a:ext>
+            </a:extLst>
+          </p:cNvPr>
+          <p:cNvSpPr txBox="1"/>
+          <p:nvPr/>
+        </p:nvSpPr>
+        <p:spPr>
+          <a:xfrm>
+            <a:off x="1103608" y="5143713"/>
+            <a:ext cx="5022872" cy="253916"/>
+          </a:xfrm>
+          <a:prstGeom prst="rect">
+            <a:avLst/>
+          </a:prstGeom>
+          <a:noFill/>
+        </p:spPr>
+        <p:txBody>
+          <a:bodyPr wrap="square" rtlCol="0">
+            <a:spAutoFit/>
+          </a:bodyPr>
+          <a:lstStyle/>
+          <a:p>
+            <a:pPr algn="ctr"/>
+            <a:r>
+              <a:rPr lang="ko-KR" altLang="en-US" sz="1050" b="0" i="0" dirty="0">
+                <a:solidFill>
+                  <a:srgbClr val="1F2328"/>
+                </a:solidFill>
+                <a:effectLst/>
+                <a:latin typeface="-apple-system"/>
+              </a:rPr>
+              <a:t>유원준</a:t>
+            </a:r>
+            <a:r>
+              <a:rPr lang="en-US" altLang="ko-KR" sz="1050" b="0" i="0" dirty="0">
+                <a:solidFill>
+                  <a:srgbClr val="1F2328"/>
+                </a:solidFill>
+                <a:effectLst/>
+                <a:latin typeface="-apple-system"/>
+              </a:rPr>
+              <a:t>/</a:t>
+            </a:r>
+            <a:r>
+              <a:rPr lang="ko-KR" altLang="en-US" sz="1050" b="0" i="0" dirty="0">
+                <a:solidFill>
+                  <a:srgbClr val="1F2328"/>
+                </a:solidFill>
+                <a:effectLst/>
+                <a:latin typeface="-apple-system"/>
+              </a:rPr>
+              <a:t>안상준</a:t>
+            </a:r>
+            <a:r>
+              <a:rPr lang="en-US" altLang="ko-KR" sz="1050" b="0" i="0" dirty="0">
+                <a:solidFill>
+                  <a:srgbClr val="1F2328"/>
+                </a:solidFill>
+                <a:effectLst/>
+                <a:latin typeface="-apple-system"/>
+              </a:rPr>
+              <a:t>, "</a:t>
+            </a:r>
+            <a:r>
+              <a:rPr lang="ko-KR" altLang="en-US" sz="1050" b="0" i="0" dirty="0">
+                <a:solidFill>
+                  <a:srgbClr val="1F2328"/>
+                </a:solidFill>
+                <a:effectLst/>
+                <a:latin typeface="-apple-system"/>
+              </a:rPr>
+              <a:t>딥 러닝을 이용한 자연어 처리 입문</a:t>
+            </a:r>
+            <a:r>
+              <a:rPr lang="en-US" altLang="ko-KR" sz="1050" b="0" i="0" dirty="0">
+                <a:solidFill>
+                  <a:srgbClr val="1F2328"/>
+                </a:solidFill>
+                <a:effectLst/>
+                <a:latin typeface="-apple-system"/>
+              </a:rPr>
+              <a:t>", 2022</a:t>
+            </a:r>
+            <a:endParaRPr kumimoji="1" lang="ja-JP" altLang="en-US" sz="1050" dirty="0"/>
+          </a:p>
+        </p:txBody>
+      </p:sp>
+      <mc:AlternateContent xmlns:mc="http://schemas.openxmlformats.org/markup-compatibility/2006">
+        <mc:Choice xmlns:a14="http://schemas.microsoft.com/office/drawing/2010/main" Requires="a14">
+          <p:sp>
+            <p:nvSpPr>
+              <p:cNvPr id="5" name="テキスト ボックス 4">
+                <a:extLst>
+                  <a:ext uri="{FF2B5EF4-FFF2-40B4-BE49-F238E27FC236}">
+                    <a16:creationId xmlns:a16="http://schemas.microsoft.com/office/drawing/2014/main" id="{D80AE669-AC26-2316-56F5-5130A0BE3DCD}"/>
+                  </a:ext>
+                </a:extLst>
+              </p:cNvPr>
+              <p:cNvSpPr txBox="1"/>
+              <p:nvPr/>
+            </p:nvSpPr>
+            <p:spPr>
+              <a:xfrm>
+                <a:off x="6422086" y="3429000"/>
+                <a:ext cx="5059680" cy="2988126"/>
+              </a:xfrm>
+              <a:prstGeom prst="rect">
+                <a:avLst/>
+              </a:prstGeom>
+              <a:noFill/>
+            </p:spPr>
+            <p:txBody>
+              <a:bodyPr wrap="square" rtlCol="0">
+                <a:spAutoFit/>
+              </a:bodyPr>
+              <a:lstStyle/>
+              <a:p>
+                <a14:m>
+                  <m:oMathPara xmlns:m="http://schemas.openxmlformats.org/officeDocument/2006/math">
+                    <m:oMathParaPr>
+                      <m:jc m:val="centerGroup"/>
+                    </m:oMathParaPr>
+                    <m:oMath xmlns:m="http://schemas.openxmlformats.org/officeDocument/2006/math">
+                      <m:sSub>
+                        <m:sSubPr>
+                          <m:ctrlPr>
+                            <a:rPr kumimoji="1" lang="en-US" altLang="ja-JP" sz="2800" b="0" i="1" smtClean="0">
+                              <a:latin typeface="Cambria Math" panose="02040503050406030204" pitchFamily="18" charset="0"/>
+                            </a:rPr>
+                          </m:ctrlPr>
+                        </m:sSubPr>
+                        <m:e>
+                          <m:r>
+                            <a:rPr kumimoji="1" lang="en-US" altLang="ja-JP" sz="2800" i="1">
+                              <a:latin typeface="Cambria Math" panose="02040503050406030204" pitchFamily="18" charset="0"/>
+                            </a:rPr>
+                            <m:t>𝑃𝐸</m:t>
+                          </m:r>
+                        </m:e>
+                        <m:sub>
+                          <m:r>
+                            <a:rPr kumimoji="1" lang="en-US" altLang="ja-JP" sz="2800" b="0" i="1" smtClean="0">
+                              <a:latin typeface="Cambria Math" panose="02040503050406030204" pitchFamily="18" charset="0"/>
+                            </a:rPr>
+                            <m:t>(</m:t>
+                          </m:r>
+                          <m:r>
+                            <a:rPr kumimoji="1" lang="en-US" altLang="ja-JP" sz="2800" b="0" i="1" smtClean="0">
+                              <a:latin typeface="Cambria Math" panose="02040503050406030204" pitchFamily="18" charset="0"/>
+                            </a:rPr>
+                            <m:t>𝑝𝑜𝑠</m:t>
+                          </m:r>
+                          <m:r>
+                            <a:rPr kumimoji="1" lang="en-US" altLang="ja-JP" sz="2800" b="0" i="1" smtClean="0">
+                              <a:latin typeface="Cambria Math" panose="02040503050406030204" pitchFamily="18" charset="0"/>
+                            </a:rPr>
+                            <m:t>, 2</m:t>
+                          </m:r>
+                          <m:r>
+                            <a:rPr kumimoji="1" lang="en-US" altLang="ja-JP" sz="2800" b="0" i="1" smtClean="0">
+                              <a:latin typeface="Cambria Math" panose="02040503050406030204" pitchFamily="18" charset="0"/>
+                            </a:rPr>
+                            <m:t>𝑖</m:t>
+                          </m:r>
+                          <m:r>
+                            <a:rPr kumimoji="1" lang="en-US" altLang="ja-JP" sz="2800" b="0" i="1" smtClean="0">
+                              <a:latin typeface="Cambria Math" panose="02040503050406030204" pitchFamily="18" charset="0"/>
+                            </a:rPr>
+                            <m:t>)</m:t>
+                          </m:r>
+                        </m:sub>
+                      </m:sSub>
+                      <m:r>
+                        <a:rPr kumimoji="1" lang="en-US" altLang="ja-JP" sz="2800" b="0" i="1" smtClean="0">
+                          <a:latin typeface="Cambria Math" panose="02040503050406030204" pitchFamily="18" charset="0"/>
+                        </a:rPr>
+                        <m:t>=</m:t>
+                      </m:r>
+                      <m:func>
+                        <m:funcPr>
+                          <m:ctrlPr>
+                            <a:rPr kumimoji="1" lang="en-US" altLang="ja-JP" sz="2800" b="0" i="1" smtClean="0">
+                              <a:latin typeface="Cambria Math" panose="02040503050406030204" pitchFamily="18" charset="0"/>
+                            </a:rPr>
+                          </m:ctrlPr>
+                        </m:funcPr>
+                        <m:fName>
+                          <m:r>
+                            <m:rPr>
+                              <m:sty m:val="p"/>
+                            </m:rPr>
+                            <a:rPr kumimoji="1" lang="en-US" altLang="ja-JP" sz="2800" b="0" i="0" smtClean="0">
+                              <a:latin typeface="Cambria Math" panose="02040503050406030204" pitchFamily="18" charset="0"/>
+                            </a:rPr>
+                            <m:t>sin</m:t>
+                          </m:r>
+                        </m:fName>
+                        <m:e>
+                          <m:d>
+                            <m:dPr>
+                              <m:ctrlPr>
+                                <a:rPr kumimoji="1" lang="en-US" altLang="ja-JP" sz="2800" b="0" i="1" smtClean="0">
+                                  <a:latin typeface="Cambria Math" panose="02040503050406030204" pitchFamily="18" charset="0"/>
+                                </a:rPr>
+                              </m:ctrlPr>
+                            </m:dPr>
+                            <m:e>
+                              <m:f>
+                                <m:fPr>
+                                  <m:ctrlPr>
+                                    <a:rPr kumimoji="1" lang="en-US" altLang="ja-JP" sz="2800" b="0" i="1" smtClean="0">
+                                      <a:latin typeface="Cambria Math" panose="02040503050406030204" pitchFamily="18" charset="0"/>
+                                    </a:rPr>
+                                  </m:ctrlPr>
+                                </m:fPr>
+                                <m:num>
+                                  <m:r>
+                                    <a:rPr kumimoji="1" lang="en-US" altLang="ja-JP" sz="2800" b="0" i="1" smtClean="0">
+                                      <a:latin typeface="Cambria Math" panose="02040503050406030204" pitchFamily="18" charset="0"/>
+                                    </a:rPr>
+                                    <m:t>𝑝𝑜𝑠</m:t>
+                                  </m:r>
+                                </m:num>
+                                <m:den>
+                                  <m:sSup>
+                                    <m:sSupPr>
+                                      <m:ctrlPr>
+                                        <a:rPr kumimoji="1" lang="en-US" altLang="ja-JP" sz="2800" b="0" i="1" smtClean="0">
+                                          <a:latin typeface="Cambria Math" panose="02040503050406030204" pitchFamily="18" charset="0"/>
+                                        </a:rPr>
+                                      </m:ctrlPr>
+                                    </m:sSupPr>
+                                    <m:e>
+                                      <m:r>
+                                        <a:rPr kumimoji="1" lang="en-US" altLang="ja-JP" sz="2800" b="0" i="1" smtClean="0">
+                                          <a:latin typeface="Cambria Math" panose="02040503050406030204" pitchFamily="18" charset="0"/>
+                                        </a:rPr>
+                                        <m:t>10000</m:t>
+                                      </m:r>
+                                    </m:e>
+                                    <m:sup>
+                                      <m:f>
+                                        <m:fPr>
+                                          <m:ctrlPr>
+                                            <a:rPr kumimoji="1" lang="en-US" altLang="ja-JP" sz="2800" b="0" i="1" smtClean="0">
+                                              <a:latin typeface="Cambria Math" panose="02040503050406030204" pitchFamily="18" charset="0"/>
+                                            </a:rPr>
+                                          </m:ctrlPr>
+                                        </m:fPr>
+                                        <m:num>
+                                          <m:r>
+                                            <a:rPr kumimoji="1" lang="en-US" altLang="ja-JP" sz="2800" b="0" i="1" smtClean="0">
+                                              <a:latin typeface="Cambria Math" panose="02040503050406030204" pitchFamily="18" charset="0"/>
+                                            </a:rPr>
+                                            <m:t>2</m:t>
+                                          </m:r>
+                                          <m:r>
+                                            <a:rPr kumimoji="1" lang="en-US" altLang="ja-JP" sz="2800" b="0" i="1" smtClean="0">
+                                              <a:latin typeface="Cambria Math" panose="02040503050406030204" pitchFamily="18" charset="0"/>
+                                            </a:rPr>
+                                            <m:t>𝑖</m:t>
+                                          </m:r>
+                                        </m:num>
+                                        <m:den>
+                                          <m:sSub>
+                                            <m:sSubPr>
+                                              <m:ctrlPr>
+                                                <a:rPr kumimoji="1" lang="en-US" altLang="ja-JP" sz="2800" b="0" i="1" smtClean="0">
+                                                  <a:latin typeface="Cambria Math" panose="02040503050406030204" pitchFamily="18" charset="0"/>
+                                                </a:rPr>
+                                              </m:ctrlPr>
+                                            </m:sSubPr>
+                                            <m:e>
+                                              <m:r>
+                                                <a:rPr kumimoji="1" lang="en-US" altLang="ja-JP" sz="2800" b="0" i="1" smtClean="0">
+                                                  <a:latin typeface="Cambria Math" panose="02040503050406030204" pitchFamily="18" charset="0"/>
+                                                </a:rPr>
+                                                <m:t>𝑑</m:t>
+                                              </m:r>
+                                            </m:e>
+                                            <m:sub>
+                                              <m:r>
+                                                <a:rPr kumimoji="1" lang="en-US" altLang="ja-JP" sz="2800" b="0" i="1" smtClean="0">
+                                                  <a:latin typeface="Cambria Math" panose="02040503050406030204" pitchFamily="18" charset="0"/>
+                                                </a:rPr>
+                                                <m:t>𝑚𝑜𝑑𝑒𝑙</m:t>
+                                              </m:r>
+                                            </m:sub>
+                                          </m:sSub>
+                                        </m:den>
+                                      </m:f>
+                                    </m:sup>
+                                  </m:sSup>
+                                </m:den>
+                              </m:f>
+                            </m:e>
+                          </m:d>
+                        </m:e>
+                      </m:func>
+                    </m:oMath>
+                  </m:oMathPara>
+                </a14:m>
+                <a:endParaRPr kumimoji="1" lang="en-US" altLang="ja-JP" sz="2800" b="0" dirty="0"/>
+              </a:p>
+              <a:p>
+                <a:endParaRPr kumimoji="1" lang="en-US" altLang="ja-JP" sz="2800" b="0" i="1" dirty="0">
+                  <a:latin typeface="Cambria Math" panose="02040503050406030204" pitchFamily="18" charset="0"/>
+                </a:endParaRPr>
+              </a:p>
+              <a:p>
+                <a14:m>
+                  <m:oMathPara xmlns:m="http://schemas.openxmlformats.org/officeDocument/2006/math">
+                    <m:oMathParaPr>
+                      <m:jc m:val="centerGroup"/>
+                    </m:oMathParaPr>
+                    <m:oMath xmlns:m="http://schemas.openxmlformats.org/officeDocument/2006/math">
+                      <m:sSub>
+                        <m:sSubPr>
+                          <m:ctrlPr>
+                            <a:rPr kumimoji="1" lang="en-US" altLang="ja-JP" sz="2800" b="0" i="1" smtClean="0">
+                              <a:latin typeface="Cambria Math" panose="02040503050406030204" pitchFamily="18" charset="0"/>
+                            </a:rPr>
+                          </m:ctrlPr>
+                        </m:sSubPr>
+                        <m:e>
+                          <m:r>
+                            <a:rPr kumimoji="1" lang="en-US" altLang="ja-JP" sz="2800" i="1">
+                              <a:latin typeface="Cambria Math" panose="02040503050406030204" pitchFamily="18" charset="0"/>
+                            </a:rPr>
+                            <m:t>𝑃𝐸</m:t>
+                          </m:r>
+                        </m:e>
+                        <m:sub>
+                          <m:r>
+                            <a:rPr kumimoji="1" lang="en-US" altLang="ja-JP" sz="2800" b="0" i="1" smtClean="0">
+                              <a:latin typeface="Cambria Math" panose="02040503050406030204" pitchFamily="18" charset="0"/>
+                            </a:rPr>
+                            <m:t>(</m:t>
+                          </m:r>
+                          <m:r>
+                            <a:rPr kumimoji="1" lang="en-US" altLang="ja-JP" sz="2800" b="0" i="1" smtClean="0">
+                              <a:latin typeface="Cambria Math" panose="02040503050406030204" pitchFamily="18" charset="0"/>
+                            </a:rPr>
+                            <m:t>𝑝𝑜𝑠</m:t>
+                          </m:r>
+                          <m:r>
+                            <a:rPr kumimoji="1" lang="en-US" altLang="ja-JP" sz="2800" b="0" i="1" smtClean="0">
+                              <a:latin typeface="Cambria Math" panose="02040503050406030204" pitchFamily="18" charset="0"/>
+                            </a:rPr>
+                            <m:t>, 2</m:t>
+                          </m:r>
+                          <m:r>
+                            <a:rPr kumimoji="1" lang="en-US" altLang="ja-JP" sz="2800" b="0" i="1" smtClean="0">
+                              <a:latin typeface="Cambria Math" panose="02040503050406030204" pitchFamily="18" charset="0"/>
+                            </a:rPr>
+                            <m:t>𝑖</m:t>
+                          </m:r>
+                          <m:r>
+                            <a:rPr kumimoji="1" lang="en-US" altLang="ja-JP" sz="2800" b="0" i="1" smtClean="0">
+                              <a:latin typeface="Cambria Math" panose="02040503050406030204" pitchFamily="18" charset="0"/>
+                            </a:rPr>
+                            <m:t>+1</m:t>
+                          </m:r>
+                          <m:r>
+                            <a:rPr kumimoji="1" lang="en-US" altLang="ja-JP" sz="2800" b="0" i="1" smtClean="0">
+                              <a:latin typeface="Cambria Math" panose="02040503050406030204" pitchFamily="18" charset="0"/>
+                            </a:rPr>
+                            <m:t>)</m:t>
+                          </m:r>
+                        </m:sub>
+                      </m:sSub>
+                      <m:r>
+                        <a:rPr kumimoji="1" lang="en-US" altLang="ja-JP" sz="2800" b="0" i="1" smtClean="0">
+                          <a:latin typeface="Cambria Math" panose="02040503050406030204" pitchFamily="18" charset="0"/>
+                        </a:rPr>
+                        <m:t>=</m:t>
+                      </m:r>
+                      <m:r>
+                        <m:rPr>
+                          <m:sty m:val="p"/>
+                        </m:rPr>
+                        <a:rPr kumimoji="1" lang="en-US" altLang="ja-JP" sz="2800" b="0" i="0" smtClean="0">
+                          <a:latin typeface="Cambria Math" panose="02040503050406030204" pitchFamily="18" charset="0"/>
+                        </a:rPr>
+                        <m:t>cos</m:t>
+                      </m:r>
+                      <m:r>
+                        <a:rPr kumimoji="1" lang="en-US" altLang="ja-JP" sz="2800" b="0" i="1" smtClean="0">
+                          <a:latin typeface="Cambria Math" panose="02040503050406030204" pitchFamily="18" charset="0"/>
+                        </a:rPr>
+                        <m:t>⁡(</m:t>
+                      </m:r>
+                      <m:f>
+                        <m:fPr>
+                          <m:ctrlPr>
+                            <a:rPr kumimoji="1" lang="en-US" altLang="ja-JP" sz="2800" b="0" i="1" smtClean="0">
+                              <a:latin typeface="Cambria Math" panose="02040503050406030204" pitchFamily="18" charset="0"/>
+                            </a:rPr>
+                          </m:ctrlPr>
+                        </m:fPr>
+                        <m:num>
+                          <m:r>
+                            <a:rPr kumimoji="1" lang="en-US" altLang="ja-JP" sz="2800" b="0" i="1" smtClean="0">
+                              <a:latin typeface="Cambria Math" panose="02040503050406030204" pitchFamily="18" charset="0"/>
+                            </a:rPr>
+                            <m:t>𝑝𝑜𝑠</m:t>
+                          </m:r>
+                        </m:num>
+                        <m:den>
+                          <m:sSup>
+                            <m:sSupPr>
+                              <m:ctrlPr>
+                                <a:rPr kumimoji="1" lang="en-US" altLang="ja-JP" sz="2800" b="0" i="1" smtClean="0">
+                                  <a:latin typeface="Cambria Math" panose="02040503050406030204" pitchFamily="18" charset="0"/>
+                                </a:rPr>
+                              </m:ctrlPr>
+                            </m:sSupPr>
+                            <m:e>
+                              <m:r>
+                                <a:rPr kumimoji="1" lang="en-US" altLang="ja-JP" sz="2800" b="0" i="1" smtClean="0">
+                                  <a:latin typeface="Cambria Math" panose="02040503050406030204" pitchFamily="18" charset="0"/>
+                                </a:rPr>
+                                <m:t>10000</m:t>
+                              </m:r>
+                            </m:e>
+                            <m:sup>
+                              <m:f>
+                                <m:fPr>
+                                  <m:ctrlPr>
+                                    <a:rPr kumimoji="1" lang="en-US" altLang="ja-JP" sz="2800" b="0" i="1" smtClean="0">
+                                      <a:latin typeface="Cambria Math" panose="02040503050406030204" pitchFamily="18" charset="0"/>
+                                    </a:rPr>
+                                  </m:ctrlPr>
+                                </m:fPr>
+                                <m:num>
+                                  <m:r>
+                                    <a:rPr kumimoji="1" lang="en-US" altLang="ja-JP" sz="2800" b="0" i="1" smtClean="0">
+                                      <a:latin typeface="Cambria Math" panose="02040503050406030204" pitchFamily="18" charset="0"/>
+                                    </a:rPr>
+                                    <m:t>2</m:t>
+                                  </m:r>
+                                  <m:r>
+                                    <a:rPr kumimoji="1" lang="en-US" altLang="ja-JP" sz="2800" b="0" i="1" smtClean="0">
+                                      <a:latin typeface="Cambria Math" panose="02040503050406030204" pitchFamily="18" charset="0"/>
+                                    </a:rPr>
+                                    <m:t>𝑖</m:t>
+                                  </m:r>
+                                </m:num>
+                                <m:den>
+                                  <m:sSub>
+                                    <m:sSubPr>
+                                      <m:ctrlPr>
+                                        <a:rPr kumimoji="1" lang="en-US" altLang="ja-JP" sz="2800" b="0" i="1" smtClean="0">
+                                          <a:latin typeface="Cambria Math" panose="02040503050406030204" pitchFamily="18" charset="0"/>
+                                        </a:rPr>
+                                      </m:ctrlPr>
+                                    </m:sSubPr>
+                                    <m:e>
+                                      <m:r>
+                                        <a:rPr kumimoji="1" lang="en-US" altLang="ja-JP" sz="2800" b="0" i="1" smtClean="0">
+                                          <a:latin typeface="Cambria Math" panose="02040503050406030204" pitchFamily="18" charset="0"/>
+                                        </a:rPr>
+                                        <m:t>𝑑</m:t>
+                                      </m:r>
+                                    </m:e>
+                                    <m:sub>
+                                      <m:r>
+                                        <a:rPr kumimoji="1" lang="en-US" altLang="ja-JP" sz="2800" b="0" i="1" smtClean="0">
+                                          <a:latin typeface="Cambria Math" panose="02040503050406030204" pitchFamily="18" charset="0"/>
+                                        </a:rPr>
+                                        <m:t>𝑚𝑜𝑑𝑒𝑙</m:t>
+                                      </m:r>
+                                    </m:sub>
+                                  </m:sSub>
+                                </m:den>
+                              </m:f>
+                            </m:sup>
+                          </m:sSup>
+                        </m:den>
+                      </m:f>
+                      <m:r>
+                        <a:rPr kumimoji="1" lang="en-US" altLang="ja-JP" sz="2800" b="0" i="1" smtClean="0">
+                          <a:latin typeface="Cambria Math" panose="02040503050406030204" pitchFamily="18" charset="0"/>
+                        </a:rPr>
+                        <m:t>)</m:t>
+                      </m:r>
+                    </m:oMath>
+                  </m:oMathPara>
+                </a14:m>
+                <a:endParaRPr kumimoji="1" lang="ja-JP" altLang="en-US" sz="2800" dirty="0"/>
+              </a:p>
+              <a:p>
+                <a:endParaRPr kumimoji="1" lang="ja-JP" altLang="en-US" sz="2800" dirty="0"/>
+              </a:p>
+            </p:txBody>
+          </p:sp>
+        </mc:Choice>
+        <mc:Fallback>
+          <p:sp>
+            <p:nvSpPr>
+              <p:cNvPr id="5" name="テキスト ボックス 4">
+                <a:extLst>
+                  <a:ext uri="{FF2B5EF4-FFF2-40B4-BE49-F238E27FC236}">
+                    <a16:creationId xmlns:a16="http://schemas.microsoft.com/office/drawing/2014/main" id="{D80AE669-AC26-2316-56F5-5130A0BE3DCD}"/>
+                  </a:ext>
+                </a:extLst>
+              </p:cNvPr>
+              <p:cNvSpPr txBox="1">
+                <a:spLocks noRot="1" noChangeAspect="1" noMove="1" noResize="1" noEditPoints="1" noAdjustHandles="1" noChangeArrowheads="1" noChangeShapeType="1" noTextEdit="1"/>
+              </p:cNvSpPr>
+              <p:nvPr/>
+            </p:nvSpPr>
+            <p:spPr>
+              <a:xfrm>
+                <a:off x="6422086" y="3429000"/>
+                <a:ext cx="5059680" cy="2988126"/>
+              </a:xfrm>
+              <a:prstGeom prst="rect">
+                <a:avLst/>
+              </a:prstGeom>
+              <a:blipFill>
+                <a:blip r:embed="rId3"/>
+                <a:stretch>
+                  <a:fillRect/>
+                </a:stretch>
+              </a:blipFill>
+            </p:spPr>
+            <p:txBody>
+              <a:bodyPr/>
+              <a:lstStyle/>
+              <a:p>
+                <a:r>
+                  <a:rPr lang="ja-JP" altLang="en-US">
+                    <a:noFill/>
+                  </a:rPr>
+                  <a:t> </a:t>
+                </a:r>
+              </a:p>
+            </p:txBody>
+          </p:sp>
+        </mc:Fallback>
+      </mc:AlternateContent>
     </p:spTree>
     <p:extLst>
       <p:ext uri="{BB962C8B-B14F-4D97-AF65-F5344CB8AC3E}">
         <p14:creationId xmlns:p14="http://schemas.microsoft.com/office/powerpoint/2010/main" val="1737780954"/>
+      </p:ext>
+    </p:extLst>
+  </p:cSld>
+  <p:clrMapOvr>
+    <a:masterClrMapping/>
+  </p:clrMapOvr>
+</p:sld>
+</file>
+
+<file path=ppt/slides/slide6.xml><?xml version="1.0" encoding="utf-8"?>
+<p:sld xmlns:a="http://schemas.openxmlformats.org/drawingml/2006/main" xmlns:r="http://schemas.openxmlformats.org/officeDocument/2006/relationships" xmlns:p="http://schemas.openxmlformats.org/presentationml/2006/main">
+  <p:cSld>
+    <p:spTree>
+      <p:nvGrpSpPr>
+        <p:cNvPr id="1" name=""/>
+        <p:cNvGrpSpPr/>
+        <p:nvPr/>
+      </p:nvGrpSpPr>
+      <p:grpSpPr>
+        <a:xfrm>
+          <a:off x="0" y="0"/>
+          <a:ext cx="0" cy="0"/>
+          <a:chOff x="0" y="0"/>
+          <a:chExt cx="0" cy="0"/>
+        </a:xfrm>
+      </p:grpSpPr>
+      <p:sp>
+        <p:nvSpPr>
+          <p:cNvPr id="2" name="タイトル 1">
+            <a:extLst>
+              <a:ext uri="{FF2B5EF4-FFF2-40B4-BE49-F238E27FC236}">
+                <a16:creationId xmlns:a16="http://schemas.microsoft.com/office/drawing/2014/main" id="{604E0BC0-12D7-AD35-F760-5BA3B8BA8878}"/>
+              </a:ext>
+            </a:extLst>
+          </p:cNvPr>
+          <p:cNvSpPr>
+            <a:spLocks noGrp="1"/>
+          </p:cNvSpPr>
+          <p:nvPr>
+            <p:ph type="title"/>
+          </p:nvPr>
+        </p:nvSpPr>
+        <p:spPr>
+          <a:xfrm>
+            <a:off x="1097280" y="286603"/>
+            <a:ext cx="10058400" cy="1450757"/>
+          </a:xfrm>
+        </p:spPr>
+        <p:txBody>
+          <a:bodyPr anchor="b">
+            <a:normAutofit/>
+          </a:bodyPr>
+          <a:lstStyle/>
+          <a:p>
+            <a:r>
+              <a:rPr kumimoji="1" lang="en-US" altLang="ja-JP" dirty="0"/>
+              <a:t>Positional Encoding</a:t>
+            </a:r>
+            <a:endParaRPr kumimoji="1" lang="ja-JP" altLang="en-US" dirty="0"/>
+          </a:p>
+        </p:txBody>
+      </p:sp>
+      <p:pic>
+        <p:nvPicPr>
+          <p:cNvPr id="2050" name="Picture 2" descr="グラフ, 棒グラフ, ヒストグラム&#10;&#10;自動的に生成された説明">
+            <a:extLst>
+              <a:ext uri="{FF2B5EF4-FFF2-40B4-BE49-F238E27FC236}">
+                <a16:creationId xmlns:a16="http://schemas.microsoft.com/office/drawing/2014/main" id="{419BBA25-6295-9A92-1D6B-3FC165FC8B59}"/>
+              </a:ext>
+            </a:extLst>
+          </p:cNvPr>
+          <p:cNvPicPr>
+            <a:picLocks noChangeAspect="1" noChangeArrowheads="1"/>
+          </p:cNvPicPr>
+          <p:nvPr/>
+        </p:nvPicPr>
+        <p:blipFill>
+          <a:blip r:embed="rId2">
+            <a:extLst>
+              <a:ext uri="{28A0092B-C50C-407E-A947-70E740481C1C}">
+                <a14:useLocalDpi xmlns:a14="http://schemas.microsoft.com/office/drawing/2010/main" val="0"/>
+              </a:ext>
+            </a:extLst>
+          </a:blip>
+          <a:stretch>
+            <a:fillRect/>
+          </a:stretch>
+        </p:blipFill>
+        <p:spPr bwMode="auto">
+          <a:xfrm>
+            <a:off x="6515944" y="2627531"/>
+            <a:ext cx="4639736" cy="3635428"/>
+          </a:xfrm>
+          <a:prstGeom prst="rect">
+            <a:avLst/>
+          </a:prstGeom>
+          <a:solidFill>
+            <a:srgbClr val="FFFFFF"/>
+          </a:solidFill>
+          <a:extLst>
+            <a:ext uri="{909E8E84-426E-40DD-AFC4-6F175D3DCCD1}">
+              <a14:hiddenFill xmlns:a14="http://schemas.microsoft.com/office/drawing/2010/main">
+                <a:solidFill>
+                  <a:srgbClr val="FFFFFF"/>
+                </a:solidFill>
+              </a14:hiddenFill>
+            </a:ext>
+          </a:extLst>
+        </p:spPr>
+      </p:pic>
+      <p:sp>
+        <p:nvSpPr>
+          <p:cNvPr id="4" name="テキスト ボックス 3">
+            <a:extLst>
+              <a:ext uri="{FF2B5EF4-FFF2-40B4-BE49-F238E27FC236}">
+                <a16:creationId xmlns:a16="http://schemas.microsoft.com/office/drawing/2014/main" id="{C6B9877D-FB49-5471-B69A-05F8E466F136}"/>
+              </a:ext>
+            </a:extLst>
+          </p:cNvPr>
+          <p:cNvSpPr txBox="1"/>
+          <p:nvPr/>
+        </p:nvSpPr>
+        <p:spPr>
+          <a:xfrm>
+            <a:off x="6485464" y="2022050"/>
+            <a:ext cx="4700695" cy="646331"/>
+          </a:xfrm>
+          <a:prstGeom prst="rect">
+            <a:avLst/>
+          </a:prstGeom>
+          <a:noFill/>
+        </p:spPr>
+        <p:txBody>
+          <a:bodyPr wrap="square" rtlCol="0">
+            <a:spAutoFit/>
+          </a:bodyPr>
+          <a:lstStyle/>
+          <a:p>
+            <a:pPr algn="ctr"/>
+            <a:r>
+              <a:rPr kumimoji="1" lang="en-US" altLang="ja-JP" dirty="0"/>
+              <a:t>Pos=50, </a:t>
+            </a:r>
+            <a:r>
+              <a:rPr kumimoji="1" lang="en-US" altLang="ja-JP" dirty="0" err="1"/>
+              <a:t>d_model</a:t>
+            </a:r>
+            <a:r>
+              <a:rPr kumimoji="1" lang="en-US" altLang="ja-JP" dirty="0"/>
+              <a:t>=128(</a:t>
+            </a:r>
+            <a:r>
+              <a:rPr kumimoji="1" lang="ja-JP" altLang="en-US" dirty="0"/>
+              <a:t>論文では</a:t>
+            </a:r>
+            <a:r>
+              <a:rPr kumimoji="1" lang="en-US" altLang="ja-JP" dirty="0"/>
+              <a:t>512)</a:t>
+            </a:r>
+            <a:r>
+              <a:rPr kumimoji="1" lang="ja-JP" altLang="en-US" dirty="0"/>
+              <a:t>の時の</a:t>
+            </a:r>
+            <a:endParaRPr kumimoji="1" lang="en-US" altLang="ja-JP" dirty="0"/>
+          </a:p>
+          <a:p>
+            <a:pPr algn="ctr"/>
+            <a:r>
+              <a:rPr kumimoji="1" lang="en-US" altLang="ja-JP" dirty="0"/>
+              <a:t>Positional</a:t>
+            </a:r>
+            <a:r>
+              <a:rPr kumimoji="1" lang="ko-KR" altLang="en-US" dirty="0"/>
+              <a:t> </a:t>
+            </a:r>
+            <a:r>
+              <a:rPr kumimoji="1" lang="en-US" altLang="ko-KR" dirty="0"/>
+              <a:t>Encoding</a:t>
+            </a:r>
+            <a:r>
+              <a:rPr kumimoji="1" lang="ko-KR" altLang="en-US" dirty="0"/>
+              <a:t> </a:t>
+            </a:r>
+            <a:r>
+              <a:rPr kumimoji="1" lang="en-US" altLang="ko-KR" dirty="0"/>
+              <a:t>Matrix</a:t>
+            </a:r>
+            <a:endParaRPr kumimoji="1" lang="ja-JP" altLang="en-US" dirty="0"/>
+          </a:p>
+        </p:txBody>
+      </p:sp>
+      <p:pic>
+        <p:nvPicPr>
+          <p:cNvPr id="6" name="図 5">
+            <a:extLst>
+              <a:ext uri="{FF2B5EF4-FFF2-40B4-BE49-F238E27FC236}">
+                <a16:creationId xmlns:a16="http://schemas.microsoft.com/office/drawing/2014/main" id="{FE08A829-79C5-8581-B6CC-82B808A9DCF8}"/>
+              </a:ext>
+            </a:extLst>
+          </p:cNvPr>
+          <p:cNvPicPr>
+            <a:picLocks noChangeAspect="1"/>
+          </p:cNvPicPr>
+          <p:nvPr/>
+        </p:nvPicPr>
+        <p:blipFill rotWithShape="1">
+          <a:blip r:embed="rId3"/>
+          <a:srcRect l="13873" t="31952" r="13012" b="12192"/>
+          <a:stretch/>
+        </p:blipFill>
+        <p:spPr>
+          <a:xfrm>
+            <a:off x="900209" y="2022050"/>
+            <a:ext cx="5585255" cy="3830595"/>
+          </a:xfrm>
+          <a:prstGeom prst="rect">
+            <a:avLst/>
+          </a:prstGeom>
+        </p:spPr>
+      </p:pic>
+    </p:spTree>
+    <p:extLst>
+      <p:ext uri="{BB962C8B-B14F-4D97-AF65-F5344CB8AC3E}">
+        <p14:creationId xmlns:p14="http://schemas.microsoft.com/office/powerpoint/2010/main" val="2818068358"/>
+      </p:ext>
+    </p:extLst>
+  </p:cSld>
+  <p:clrMapOvr>
+    <a:masterClrMapping/>
+  </p:clrMapOvr>
+</p:sld>
+</file>
+
+<file path=ppt/slides/slide7.xml><?xml version="1.0" encoding="utf-8"?>
+<p:sld xmlns:a="http://schemas.openxmlformats.org/drawingml/2006/main" xmlns:r="http://schemas.openxmlformats.org/officeDocument/2006/relationships" xmlns:p="http://schemas.openxmlformats.org/presentationml/2006/main">
+  <p:cSld>
+    <p:spTree>
+      <p:nvGrpSpPr>
+        <p:cNvPr id="1" name=""/>
+        <p:cNvGrpSpPr/>
+        <p:nvPr/>
+      </p:nvGrpSpPr>
+      <p:grpSpPr>
+        <a:xfrm>
+          <a:off x="0" y="0"/>
+          <a:ext cx="0" cy="0"/>
+          <a:chOff x="0" y="0"/>
+          <a:chExt cx="0" cy="0"/>
+        </a:xfrm>
+      </p:grpSpPr>
+      <p:sp>
+        <p:nvSpPr>
+          <p:cNvPr id="2" name="タイトル 1">
+            <a:extLst>
+              <a:ext uri="{FF2B5EF4-FFF2-40B4-BE49-F238E27FC236}">
+                <a16:creationId xmlns:a16="http://schemas.microsoft.com/office/drawing/2014/main" id="{8F04AF5B-2FA0-976E-0CC8-AED9853A412A}"/>
+              </a:ext>
+            </a:extLst>
+          </p:cNvPr>
+          <p:cNvSpPr>
+            <a:spLocks noGrp="1"/>
+          </p:cNvSpPr>
+          <p:nvPr>
+            <p:ph type="title"/>
+          </p:nvPr>
+        </p:nvSpPr>
+        <p:spPr/>
+        <p:txBody>
+          <a:bodyPr/>
+          <a:lstStyle/>
+          <a:p>
+            <a:r>
+              <a:rPr lang="en-US" altLang="ja-JP" dirty="0"/>
+              <a:t>Encoder </a:t>
+            </a:r>
+            <a:r>
+              <a:rPr lang="ja-JP" altLang="en-US" dirty="0"/>
+              <a:t>の </a:t>
+            </a:r>
+            <a:r>
+              <a:rPr lang="en-US" altLang="ja-JP" dirty="0"/>
+              <a:t>Self-Attention</a:t>
+            </a:r>
+            <a:endParaRPr kumimoji="1" lang="ja-JP" altLang="en-US" dirty="0"/>
+          </a:p>
+        </p:txBody>
+      </p:sp>
+      <p:sp>
+        <p:nvSpPr>
+          <p:cNvPr id="3" name="コンテンツ プレースホルダー 2">
+            <a:extLst>
+              <a:ext uri="{FF2B5EF4-FFF2-40B4-BE49-F238E27FC236}">
+                <a16:creationId xmlns:a16="http://schemas.microsoft.com/office/drawing/2014/main" id="{05989058-92FF-7A55-0696-C48CD741D1D3}"/>
+              </a:ext>
+            </a:extLst>
+          </p:cNvPr>
+          <p:cNvSpPr>
+            <a:spLocks noGrp="1"/>
+          </p:cNvSpPr>
+          <p:nvPr>
+            <p:ph sz="half" idx="1"/>
+          </p:nvPr>
+        </p:nvSpPr>
+        <p:spPr>
+          <a:xfrm>
+            <a:off x="1097280" y="2120900"/>
+            <a:ext cx="6459220" cy="4241800"/>
+          </a:xfrm>
+        </p:spPr>
+        <p:txBody>
+          <a:bodyPr>
+            <a:noAutofit/>
+          </a:bodyPr>
+          <a:lstStyle/>
+          <a:p>
+            <a:r>
+              <a:rPr kumimoji="1" lang="en-US" altLang="ja-JP" sz="2200" dirty="0"/>
+              <a:t>Attention</a:t>
+            </a:r>
+            <a:r>
+              <a:rPr kumimoji="1" lang="ja-JP" altLang="en-US" sz="2200" dirty="0"/>
+              <a:t>関数</a:t>
+            </a:r>
+            <a:r>
+              <a:rPr kumimoji="1" lang="en-US" altLang="ja-JP" sz="2200" dirty="0"/>
+              <a:t>: Query</a:t>
+            </a:r>
+            <a:r>
+              <a:rPr kumimoji="1" lang="ja-JP" altLang="en-US" sz="2200" dirty="0"/>
+              <a:t>を全て</a:t>
+            </a:r>
+            <a:r>
+              <a:rPr lang="ja-JP" altLang="en-US" sz="2200" dirty="0"/>
+              <a:t>の</a:t>
+            </a:r>
+            <a:r>
+              <a:rPr kumimoji="1" lang="en-US" altLang="ko-KR" sz="2200" dirty="0"/>
+              <a:t>Key</a:t>
+            </a:r>
+            <a:r>
+              <a:rPr kumimoji="1" lang="ja-JP" altLang="en-US" sz="2200" dirty="0"/>
+              <a:t>と比べ類似度を求めたあと、ここで得た類似度を加重値</a:t>
+            </a:r>
+            <a:r>
+              <a:rPr kumimoji="1" lang="en-US" altLang="ja-JP" sz="2200" dirty="0"/>
+              <a:t>(Weight)</a:t>
+            </a:r>
+            <a:r>
+              <a:rPr kumimoji="1" lang="ja-JP" altLang="en-US" sz="2200" dirty="0"/>
+              <a:t>とし、それぞれの</a:t>
+            </a:r>
+            <a:r>
+              <a:rPr kumimoji="1" lang="en-US" altLang="ja-JP" sz="2200" dirty="0"/>
+              <a:t>Key</a:t>
+            </a:r>
+            <a:r>
+              <a:rPr kumimoji="1" lang="ja-JP" altLang="en-US" sz="2200" dirty="0"/>
+              <a:t>たちの</a:t>
+            </a:r>
+            <a:r>
+              <a:rPr kumimoji="1" lang="en-US" altLang="ja-JP" sz="2200" dirty="0"/>
+              <a:t>Value</a:t>
+            </a:r>
+            <a:r>
+              <a:rPr kumimoji="1" lang="ja-JP" altLang="en-US" sz="2200" dirty="0"/>
+              <a:t>に反映する。最終的に、この全ての</a:t>
+            </a:r>
+            <a:r>
+              <a:rPr kumimoji="1" lang="en-US" altLang="ja-JP" sz="2200" dirty="0"/>
+              <a:t>Value</a:t>
+            </a:r>
+            <a:r>
+              <a:rPr kumimoji="1" lang="ja-JP" altLang="en-US" sz="2200" dirty="0"/>
+              <a:t>たちを加重合</a:t>
+            </a:r>
+            <a:r>
+              <a:rPr kumimoji="1" lang="en-US" altLang="ja-JP" sz="2200" dirty="0"/>
+              <a:t>(Weighted Sum)</a:t>
+            </a:r>
+            <a:r>
+              <a:rPr kumimoji="1" lang="ja-JP" altLang="en-US" sz="2200" dirty="0"/>
+              <a:t>しリターンする。</a:t>
+            </a:r>
+            <a:endParaRPr kumimoji="1" lang="en-US" altLang="ja-JP" sz="2200" dirty="0"/>
+          </a:p>
+          <a:p>
+            <a:endParaRPr lang="en-US" altLang="ja-JP" sz="2200" dirty="0"/>
+          </a:p>
+          <a:p>
+            <a:r>
+              <a:rPr lang="en-US" altLang="ja-JP" sz="1200" dirty="0"/>
+              <a:t>Q: </a:t>
+            </a:r>
+            <a:r>
+              <a:rPr lang="ja-JP" altLang="en-US" sz="1200" dirty="0"/>
+              <a:t>ある時点での</a:t>
+            </a:r>
+            <a:r>
+              <a:rPr lang="en-US" altLang="ja-JP" sz="1200" dirty="0"/>
+              <a:t>Decoder cell</a:t>
+            </a:r>
+            <a:r>
+              <a:rPr lang="ja-JP" altLang="en-US" sz="1200" dirty="0"/>
+              <a:t>の</a:t>
+            </a:r>
+            <a:r>
+              <a:rPr lang="en-US" altLang="ja-JP" sz="1200" dirty="0"/>
+              <a:t>Hidden state.</a:t>
+            </a:r>
+          </a:p>
+          <a:p>
+            <a:r>
+              <a:rPr lang="en-US" altLang="ja-JP" sz="1200" dirty="0"/>
+              <a:t>K: </a:t>
+            </a:r>
+            <a:r>
+              <a:rPr lang="ja-JP" altLang="en-US" sz="1200" dirty="0"/>
+              <a:t>全ての時点での</a:t>
+            </a:r>
+            <a:r>
+              <a:rPr lang="en-US" altLang="ja-JP" sz="1200" dirty="0"/>
+              <a:t>Encoder cell</a:t>
+            </a:r>
+            <a:r>
+              <a:rPr lang="ja-JP" altLang="en-US" sz="1200" dirty="0"/>
+              <a:t>の</a:t>
+            </a:r>
+            <a:r>
+              <a:rPr lang="en-US" altLang="ja-JP" sz="1200" dirty="0"/>
+              <a:t>Hidden state</a:t>
+            </a:r>
+            <a:r>
+              <a:rPr lang="ja-JP" altLang="en-US" sz="1200" dirty="0"/>
+              <a:t>たち</a:t>
+            </a:r>
+            <a:endParaRPr lang="en-US" altLang="ja-JP" sz="1200" dirty="0"/>
+          </a:p>
+          <a:p>
+            <a:r>
+              <a:rPr lang="en-US" altLang="ja-JP" sz="1200" dirty="0"/>
+              <a:t>V: </a:t>
+            </a:r>
+            <a:r>
+              <a:rPr lang="ja-JP" altLang="en-US" sz="1200" dirty="0"/>
+              <a:t>全ての時点での</a:t>
+            </a:r>
+            <a:r>
+              <a:rPr lang="en-US" altLang="ja-JP" sz="1200" dirty="0"/>
+              <a:t>Encoder cell</a:t>
+            </a:r>
+            <a:r>
+              <a:rPr lang="ja-JP" altLang="en-US" sz="1200" dirty="0"/>
+              <a:t>の</a:t>
+            </a:r>
+            <a:r>
+              <a:rPr lang="en-US" altLang="ja-JP" sz="1200" dirty="0"/>
+              <a:t>Hidden state</a:t>
+            </a:r>
+            <a:r>
+              <a:rPr lang="ja-JP" altLang="en-US" sz="1200" dirty="0"/>
+              <a:t>たち</a:t>
+            </a:r>
+            <a:endParaRPr lang="en-US" altLang="ja-JP" sz="1200" dirty="0"/>
+          </a:p>
+          <a:p>
+            <a:r>
+              <a:rPr lang="en-US" altLang="ja-JP" sz="2600" dirty="0"/>
+              <a:t>Q, K, V: </a:t>
+            </a:r>
+            <a:r>
+              <a:rPr lang="ja-JP" altLang="en-US" sz="2600" dirty="0"/>
+              <a:t>入力文章の全ての単語ベクトルたち</a:t>
+            </a:r>
+            <a:endParaRPr lang="en-US" altLang="ja-JP" sz="2600" dirty="0"/>
+          </a:p>
+        </p:txBody>
+      </p:sp>
+      <p:grpSp>
+        <p:nvGrpSpPr>
+          <p:cNvPr id="6" name="グループ化 5">
+            <a:extLst>
+              <a:ext uri="{FF2B5EF4-FFF2-40B4-BE49-F238E27FC236}">
+                <a16:creationId xmlns:a16="http://schemas.microsoft.com/office/drawing/2014/main" id="{68868349-5D35-10D5-3DF4-1ADE101E8E0F}"/>
+              </a:ext>
+            </a:extLst>
+          </p:cNvPr>
+          <p:cNvGrpSpPr/>
+          <p:nvPr/>
+        </p:nvGrpSpPr>
+        <p:grpSpPr>
+          <a:xfrm>
+            <a:off x="8328151" y="2641511"/>
+            <a:ext cx="2524125" cy="3267849"/>
+            <a:chOff x="7041678" y="2296040"/>
+            <a:chExt cx="2524125" cy="3267849"/>
+          </a:xfrm>
+        </p:grpSpPr>
+        <p:pic>
+          <p:nvPicPr>
+            <p:cNvPr id="3074" name="Picture 2">
+              <a:extLst>
+                <a:ext uri="{FF2B5EF4-FFF2-40B4-BE49-F238E27FC236}">
+                  <a16:creationId xmlns:a16="http://schemas.microsoft.com/office/drawing/2014/main" id="{A230AA27-4D8D-7915-076A-4F5FE8BD8BAD}"/>
+                </a:ext>
+              </a:extLst>
+            </p:cNvPr>
+            <p:cNvPicPr>
+              <a:picLocks noChangeAspect="1" noChangeArrowheads="1"/>
+            </p:cNvPicPr>
+            <p:nvPr/>
+          </p:nvPicPr>
+          <p:blipFill>
+            <a:blip r:embed="rId2">
+              <a:extLst>
+                <a:ext uri="{28A0092B-C50C-407E-A947-70E740481C1C}">
+                  <a14:useLocalDpi xmlns:a14="http://schemas.microsoft.com/office/drawing/2010/main" val="0"/>
+                </a:ext>
+              </a:extLst>
+            </a:blip>
+            <a:srcRect/>
+            <a:stretch>
+              <a:fillRect/>
+            </a:stretch>
+          </p:blipFill>
+          <p:spPr bwMode="auto">
+            <a:xfrm>
+              <a:off x="7041678" y="2296040"/>
+              <a:ext cx="2524125" cy="2990850"/>
+            </a:xfrm>
+            <a:prstGeom prst="rect">
+              <a:avLst/>
+            </a:prstGeom>
+            <a:noFill/>
+            <a:extLst>
+              <a:ext uri="{909E8E84-426E-40DD-AFC4-6F175D3DCCD1}">
+                <a14:hiddenFill xmlns:a14="http://schemas.microsoft.com/office/drawing/2010/main">
+                  <a:solidFill>
+                    <a:srgbClr val="FFFFFF"/>
+                  </a:solidFill>
+                </a14:hiddenFill>
+              </a:ext>
+            </a:extLst>
+          </p:spPr>
+        </p:pic>
+        <p:sp>
+          <p:nvSpPr>
+            <p:cNvPr id="5" name="テキスト ボックス 4">
+              <a:extLst>
+                <a:ext uri="{FF2B5EF4-FFF2-40B4-BE49-F238E27FC236}">
+                  <a16:creationId xmlns:a16="http://schemas.microsoft.com/office/drawing/2014/main" id="{08474833-7CAE-2097-C440-D83775F7A389}"/>
+                </a:ext>
+              </a:extLst>
+            </p:cNvPr>
+            <p:cNvSpPr txBox="1"/>
+            <p:nvPr/>
+          </p:nvSpPr>
+          <p:spPr>
+            <a:xfrm>
+              <a:off x="7654363" y="5286890"/>
+              <a:ext cx="1298753" cy="276999"/>
+            </a:xfrm>
+            <a:prstGeom prst="rect">
+              <a:avLst/>
+            </a:prstGeom>
+            <a:noFill/>
+          </p:spPr>
+          <p:txBody>
+            <a:bodyPr wrap="none" rtlCol="0">
+              <a:spAutoFit/>
+            </a:bodyPr>
+            <a:lstStyle/>
+            <a:p>
+              <a:pPr algn="ctr"/>
+              <a:r>
+                <a:rPr kumimoji="1" lang="en-US" altLang="ja-JP" sz="1200" dirty="0">
+                  <a:solidFill>
+                    <a:schemeClr val="tx1">
+                      <a:lumMod val="75000"/>
+                      <a:lumOff val="25000"/>
+                    </a:schemeClr>
+                  </a:solidFill>
+                  <a:latin typeface="Meiryo UI" panose="020B0604030504040204" pitchFamily="50" charset="-128"/>
+                  <a:ea typeface="Meiryo UI" panose="020B0604030504040204" pitchFamily="50" charset="-128"/>
+                </a:rPr>
+                <a:t>Google AI Blog</a:t>
+              </a:r>
+              <a:endParaRPr kumimoji="1" lang="ja-JP" altLang="en-US" sz="1200" dirty="0">
+                <a:solidFill>
+                  <a:schemeClr val="tx1">
+                    <a:lumMod val="75000"/>
+                    <a:lumOff val="25000"/>
+                  </a:schemeClr>
+                </a:solidFill>
+                <a:latin typeface="Meiryo UI" panose="020B0604030504040204" pitchFamily="50" charset="-128"/>
+                <a:ea typeface="Meiryo UI" panose="020B0604030504040204" pitchFamily="50" charset="-128"/>
+              </a:endParaRPr>
+            </a:p>
+          </p:txBody>
+        </p:sp>
+      </p:grpSp>
+      <p:sp>
+        <p:nvSpPr>
+          <p:cNvPr id="7" name="テキスト ボックス 6">
+            <a:extLst>
+              <a:ext uri="{FF2B5EF4-FFF2-40B4-BE49-F238E27FC236}">
+                <a16:creationId xmlns:a16="http://schemas.microsoft.com/office/drawing/2014/main" id="{175811AB-38E3-3801-7266-7DD7EE028DA3}"/>
+              </a:ext>
+            </a:extLst>
+          </p:cNvPr>
+          <p:cNvSpPr txBox="1"/>
+          <p:nvPr/>
+        </p:nvSpPr>
+        <p:spPr>
+          <a:xfrm>
+            <a:off x="7942325" y="2120900"/>
+            <a:ext cx="3295779" cy="461665"/>
+          </a:xfrm>
+          <a:prstGeom prst="rect">
+            <a:avLst/>
+          </a:prstGeom>
+          <a:noFill/>
+        </p:spPr>
+        <p:txBody>
+          <a:bodyPr wrap="square" rtlCol="0">
+            <a:spAutoFit/>
+          </a:bodyPr>
+          <a:lstStyle/>
+          <a:p>
+            <a:pPr algn="ctr"/>
+            <a:r>
+              <a:rPr kumimoji="1" lang="en-US" altLang="ja-JP" sz="2400" dirty="0">
+                <a:solidFill>
+                  <a:schemeClr val="bg2">
+                    <a:lumMod val="25000"/>
+                  </a:schemeClr>
+                </a:solidFill>
+                <a:latin typeface="Meiryo UI" panose="020B0604030504040204" pitchFamily="50" charset="-128"/>
+                <a:ea typeface="Meiryo UI" panose="020B0604030504040204" pitchFamily="50" charset="-128"/>
+              </a:rPr>
+              <a:t>Self-Attention </a:t>
+            </a:r>
+            <a:r>
+              <a:rPr kumimoji="1" lang="ja-JP" altLang="en-US" sz="2400" dirty="0">
+                <a:solidFill>
+                  <a:schemeClr val="bg2">
+                    <a:lumMod val="25000"/>
+                  </a:schemeClr>
+                </a:solidFill>
+                <a:latin typeface="Meiryo UI" panose="020B0604030504040204" pitchFamily="50" charset="-128"/>
+                <a:ea typeface="Meiryo UI" panose="020B0604030504040204" pitchFamily="50" charset="-128"/>
+              </a:rPr>
+              <a:t>の効果</a:t>
+            </a:r>
+            <a:endParaRPr kumimoji="1" lang="en-US" altLang="ja-JP" sz="2400" dirty="0">
+              <a:solidFill>
+                <a:schemeClr val="bg2">
+                  <a:lumMod val="25000"/>
+                </a:schemeClr>
+              </a:solidFill>
+              <a:latin typeface="Meiryo UI" panose="020B0604030504040204" pitchFamily="50" charset="-128"/>
+              <a:ea typeface="Meiryo UI" panose="020B0604030504040204" pitchFamily="50" charset="-128"/>
+            </a:endParaRPr>
+          </a:p>
+        </p:txBody>
+      </p:sp>
+    </p:spTree>
+    <p:extLst>
+      <p:ext uri="{BB962C8B-B14F-4D97-AF65-F5344CB8AC3E}">
+        <p14:creationId xmlns:p14="http://schemas.microsoft.com/office/powerpoint/2010/main" val="2928700926"/>
+      </p:ext>
+    </p:extLst>
+  </p:cSld>
+  <p:clrMapOvr>
+    <a:masterClrMapping/>
+  </p:clrMapOvr>
+</p:sld>
+</file>
+
+<file path=ppt/slides/slide8.xml><?xml version="1.0" encoding="utf-8"?>
+<p:sld xmlns:a="http://schemas.openxmlformats.org/drawingml/2006/main" xmlns:r="http://schemas.openxmlformats.org/officeDocument/2006/relationships" xmlns:p="http://schemas.openxmlformats.org/presentationml/2006/main">
+  <p:cSld>
+    <p:spTree>
+      <p:nvGrpSpPr>
+        <p:cNvPr id="1" name=""/>
+        <p:cNvGrpSpPr/>
+        <p:nvPr/>
+      </p:nvGrpSpPr>
+      <p:grpSpPr>
+        <a:xfrm>
+          <a:off x="0" y="0"/>
+          <a:ext cx="0" cy="0"/>
+          <a:chOff x="0" y="0"/>
+          <a:chExt cx="0" cy="0"/>
+        </a:xfrm>
+      </p:grpSpPr>
+      <p:sp>
+        <p:nvSpPr>
+          <p:cNvPr id="2" name="タイトル 1">
+            <a:extLst>
+              <a:ext uri="{FF2B5EF4-FFF2-40B4-BE49-F238E27FC236}">
+                <a16:creationId xmlns:a16="http://schemas.microsoft.com/office/drawing/2014/main" id="{285D47FE-FF06-69AA-3948-39953B9667B8}"/>
+              </a:ext>
+            </a:extLst>
+          </p:cNvPr>
+          <p:cNvSpPr>
+            <a:spLocks noGrp="1"/>
+          </p:cNvSpPr>
+          <p:nvPr>
+            <p:ph type="title"/>
+          </p:nvPr>
+        </p:nvSpPr>
+        <p:spPr>
+          <a:xfrm>
+            <a:off x="1097280" y="286603"/>
+            <a:ext cx="10058400" cy="792897"/>
+          </a:xfrm>
+        </p:spPr>
+        <p:txBody>
+          <a:bodyPr>
+            <a:normAutofit/>
+          </a:bodyPr>
+          <a:lstStyle/>
+          <a:p>
+            <a:r>
+              <a:rPr lang="en-US" altLang="ja-JP" dirty="0"/>
+              <a:t>Encoder </a:t>
+            </a:r>
+            <a:r>
+              <a:rPr lang="ja-JP" altLang="en-US" dirty="0"/>
+              <a:t>の </a:t>
+            </a:r>
+            <a:r>
+              <a:rPr lang="en-US" altLang="ja-JP" dirty="0"/>
+              <a:t>Self-Attention</a:t>
+            </a:r>
+            <a:endParaRPr kumimoji="1" lang="ja-JP" altLang="en-US" dirty="0"/>
+          </a:p>
+        </p:txBody>
+      </p:sp>
+      <p:sp>
+        <p:nvSpPr>
+          <p:cNvPr id="3" name="コンテンツ プレースホルダー 2">
+            <a:extLst>
+              <a:ext uri="{FF2B5EF4-FFF2-40B4-BE49-F238E27FC236}">
+                <a16:creationId xmlns:a16="http://schemas.microsoft.com/office/drawing/2014/main" id="{938A4743-8110-E39F-8D67-42911897E7CA}"/>
+              </a:ext>
+            </a:extLst>
+          </p:cNvPr>
+          <p:cNvSpPr>
+            <a:spLocks noGrp="1"/>
+          </p:cNvSpPr>
+          <p:nvPr>
+            <p:ph sz="half" idx="1"/>
+          </p:nvPr>
+        </p:nvSpPr>
+        <p:spPr/>
+        <p:txBody>
+          <a:bodyPr/>
+          <a:lstStyle/>
+          <a:p>
+            <a:endParaRPr kumimoji="1" lang="ja-JP" altLang="en-US"/>
+          </a:p>
+        </p:txBody>
+      </p:sp>
+      <p:sp>
+        <p:nvSpPr>
+          <p:cNvPr id="4" name="コンテンツ プレースホルダー 3">
+            <a:extLst>
+              <a:ext uri="{FF2B5EF4-FFF2-40B4-BE49-F238E27FC236}">
+                <a16:creationId xmlns:a16="http://schemas.microsoft.com/office/drawing/2014/main" id="{72A00F8E-649B-77C1-AEB6-0D3E4152E224}"/>
+              </a:ext>
+            </a:extLst>
+          </p:cNvPr>
+          <p:cNvSpPr>
+            <a:spLocks noGrp="1"/>
+          </p:cNvSpPr>
+          <p:nvPr>
+            <p:ph sz="half" idx="2"/>
+          </p:nvPr>
+        </p:nvSpPr>
+        <p:spPr/>
+        <p:txBody>
+          <a:bodyPr/>
+          <a:lstStyle/>
+          <a:p>
+            <a:endParaRPr kumimoji="1" lang="ja-JP" altLang="en-US"/>
+          </a:p>
+        </p:txBody>
+      </p:sp>
+      <p:sp>
+        <p:nvSpPr>
+          <p:cNvPr id="5" name="タイトル 1">
+            <a:extLst>
+              <a:ext uri="{FF2B5EF4-FFF2-40B4-BE49-F238E27FC236}">
+                <a16:creationId xmlns:a16="http://schemas.microsoft.com/office/drawing/2014/main" id="{1834CBE9-BE25-ED86-BEA6-57E263FB6CBB}"/>
+              </a:ext>
+            </a:extLst>
+          </p:cNvPr>
+          <p:cNvSpPr txBox="1">
+            <a:spLocks/>
+          </p:cNvSpPr>
+          <p:nvPr/>
+        </p:nvSpPr>
+        <p:spPr>
+          <a:xfrm>
+            <a:off x="1097280" y="988906"/>
+            <a:ext cx="10058400" cy="792897"/>
+          </a:xfrm>
+          <a:prstGeom prst="rect">
+            <a:avLst/>
+          </a:prstGeom>
+        </p:spPr>
+        <p:txBody>
+          <a:bodyPr vert="horz" lIns="91440" tIns="45720" rIns="91440" bIns="45720" rtlCol="0" anchor="b">
+            <a:normAutofit/>
+          </a:bodyPr>
+          <a:lstStyle>
+            <a:lvl1pPr algn="l" defTabSz="914400" rtl="0" eaLnBrk="1" latinLnBrk="0" hangingPunct="1">
+              <a:lnSpc>
+                <a:spcPct val="90000"/>
+              </a:lnSpc>
+              <a:spcBef>
+                <a:spcPct val="0"/>
+              </a:spcBef>
+              <a:buNone/>
+              <a:defRPr kumimoji="1" sz="4700" i="0" kern="1200" spc="-50" baseline="0">
+                <a:solidFill>
+                  <a:schemeClr val="tx1">
+                    <a:lumMod val="75000"/>
+                    <a:lumOff val="25000"/>
+                  </a:schemeClr>
+                </a:solidFill>
+                <a:latin typeface="Meiryo UI" panose="020B0604030504040204" pitchFamily="50" charset="-128"/>
+                <a:ea typeface="Meiryo UI" panose="020B0604030504040204" pitchFamily="50" charset="-128"/>
+                <a:cs typeface="+mj-cs"/>
+              </a:defRPr>
+            </a:lvl1pPr>
+          </a:lstStyle>
+          <a:p>
+            <a:r>
+              <a:rPr lang="en-US" altLang="ja-JP" sz="3600" dirty="0"/>
+              <a:t>Scaled dot product attention</a:t>
+            </a:r>
+            <a:endParaRPr lang="ja-JP" altLang="en-US" sz="3600" dirty="0"/>
+          </a:p>
+        </p:txBody>
+      </p:sp>
+    </p:spTree>
+    <p:extLst>
+      <p:ext uri="{BB962C8B-B14F-4D97-AF65-F5344CB8AC3E}">
+        <p14:creationId xmlns:p14="http://schemas.microsoft.com/office/powerpoint/2010/main" val="3569800580"/>
       </p:ext>
     </p:extLst>
   </p:cSld>
@@ -7138,15 +8897,6 @@
 </file>
 
 <file path=customXml/item2.xml><?xml version="1.0" encoding="utf-8"?>
-<p:properties xmlns:p="http://schemas.microsoft.com/office/2006/metadata/properties" xmlns:xsi="http://www.w3.org/2001/XMLSchema-instance" xmlns:pc="http://schemas.microsoft.com/office/infopath/2007/PartnerControls">
-  <documentManagement>
-    <Status xmlns="71af3243-3dd4-4a8d-8c0d-dd76da1f02a5">Not started</Status>
-    <MediaServiceKeyPoints xmlns="71af3243-3dd4-4a8d-8c0d-dd76da1f02a5" xsi:nil="true"/>
-  </documentManagement>
-</p:properties>
-</file>
-
-<file path=customXml/item3.xml><?xml version="1.0" encoding="utf-8"?>
 <ct:contentTypeSchema xmlns:ct="http://schemas.microsoft.com/office/2006/metadata/contentType" xmlns:ma="http://schemas.microsoft.com/office/2006/metadata/properties/metaAttributes" ct:_="" ma:_="" ma:contentTypeName="Document" ma:contentTypeID="0x01010079F111ED35F8CC479449609E8A0923A6" ma:contentTypeVersion="12" ma:contentTypeDescription="Create a new document." ma:contentTypeScope="" ma:versionID="a410dd7f93c95333ffa1b60ed6adedd1">
   <xsd:schema xmlns:xsd="http://www.w3.org/2001/XMLSchema" xmlns:xs="http://www.w3.org/2001/XMLSchema" xmlns:p="http://schemas.microsoft.com/office/2006/metadata/properties" xmlns:ns2="71af3243-3dd4-4a8d-8c0d-dd76da1f02a5" xmlns:ns3="16c05727-aa75-4e4a-9b5f-8a80a1165891" targetNamespace="http://schemas.microsoft.com/office/2006/metadata/properties" ma:root="true" ma:fieldsID="a936d9baba76aa3866493feff160faab" ns2:_="" ns3:_="">
     <xsd:import namespace="71af3243-3dd4-4a8d-8c0d-dd76da1f02a5"/>
@@ -7367,6 +9117,15 @@
 </ct:contentTypeSchema>
 </file>
 
+<file path=customXml/item3.xml><?xml version="1.0" encoding="utf-8"?>
+<p:properties xmlns:p="http://schemas.microsoft.com/office/2006/metadata/properties" xmlns:xsi="http://www.w3.org/2001/XMLSchema-instance" xmlns:pc="http://schemas.microsoft.com/office/infopath/2007/PartnerControls">
+  <documentManagement>
+    <Status xmlns="71af3243-3dd4-4a8d-8c0d-dd76da1f02a5">Not started</Status>
+    <MediaServiceKeyPoints xmlns="71af3243-3dd4-4a8d-8c0d-dd76da1f02a5" xsi:nil="true"/>
+  </documentManagement>
+</p:properties>
+</file>
+
 <file path=customXml/itemProps1.xml><?xml version="1.0" encoding="utf-8"?>
 <ds:datastoreItem xmlns:ds="http://schemas.openxmlformats.org/officeDocument/2006/customXml" ds:itemID="{AA3F7EDC-E5B4-4BBC-9D2A-CBE6D46C37AD}">
   <ds:schemaRefs>
@@ -7376,16 +9135,6 @@
 </file>
 
 <file path=customXml/itemProps2.xml><?xml version="1.0" encoding="utf-8"?>
-<ds:datastoreItem xmlns:ds="http://schemas.openxmlformats.org/officeDocument/2006/customXml" ds:itemID="{A03EEFF0-FB57-4CB4-8BFC-DF397689E2ED}">
-  <ds:schemaRefs>
-    <ds:schemaRef ds:uri="http://schemas.microsoft.com/office/2006/metadata/properties"/>
-    <ds:schemaRef ds:uri="http://schemas.microsoft.com/office/infopath/2007/PartnerControls"/>
-    <ds:schemaRef ds:uri="71af3243-3dd4-4a8d-8c0d-dd76da1f02a5"/>
-  </ds:schemaRefs>
-</ds:datastoreItem>
-</file>
-
-<file path=customXml/itemProps3.xml><?xml version="1.0" encoding="utf-8"?>
 <ds:datastoreItem xmlns:ds="http://schemas.openxmlformats.org/officeDocument/2006/customXml" ds:itemID="{93932EF5-314F-409E-8020-FEE5FA0795B9}">
   <ds:schemaRefs>
     <ds:schemaRef ds:uri="http://schemas.microsoft.com/office/2006/metadata/contentType"/>
@@ -7402,4 +9151,14 @@
     <ds:schemaRef ds:uri="http://schemas.microsoft.com/internal/obd"/>
   </ds:schemaRefs>
 </ds:datastoreItem>
+</file>
+
+<file path=customXml/itemProps3.xml><?xml version="1.0" encoding="utf-8"?>
+<ds:datastoreItem xmlns:ds="http://schemas.openxmlformats.org/officeDocument/2006/customXml" ds:itemID="{A03EEFF0-FB57-4CB4-8BFC-DF397689E2ED}">
+  <ds:schemaRefs>
+    <ds:schemaRef ds:uri="http://schemas.microsoft.com/office/2006/metadata/properties"/>
+    <ds:schemaRef ds:uri="http://schemas.microsoft.com/office/infopath/2007/PartnerControls"/>
+    <ds:schemaRef ds:uri="71af3243-3dd4-4a8d-8c0d-dd76da1f02a5"/>
+  </ds:schemaRefs>
+</ds:datastoreItem>
 </file>
</xml_diff>